<commit_message>
use Liberation Sans instead of Calibri in the test for tdf#144092
based on Stephan Bergmann's point on:
<https://gerrit.libreoffice.org/c/core/+/138652/comment/bb5fc1a4_75e060c9/>

the font used in the test file was Calibri, which likely was
being replaced with the best approximation on a given system.
Changed that to Liberation Sans which is a font that is bundled
with LibreOffice to improve the test's robustness.

Change-Id: I7ff75baeb9259dea244913ca9d5025948291f1e2
Reviewed-on: https://gerrit.libreoffice.org/c/core/+/158234
Reviewed-by: Stephan Bergmann <sbergman@redhat.com>
Tested-by: Jenkins
(cherry picked from commit 676e0527d2f31556eccae314fbb12ce204f02ec7)
Reviewed-on: https://gerrit.libreoffice.org/c/core/+/158277
Reviewed-by: Xisco Fauli <xiscofauli@libreoffice.org>
</commit_message>
<xml_diff>
--- a/sd/qa/unit/data/pptx/tdf144092-tableHeight.pptx
+++ b/sd/qa/unit/data/pptx/tdf144092-tableHeight.pptx
@@ -259,7 +259,7 @@
           <a:p>
             <a:fld id="{540F1410-67F1-4DB7-A3AF-1AB76F2DEBC1}" type="datetimeFigureOut">
               <a:rPr lang="en-US" smtClean="0"/>
-              <a:t>8/30/2022</a:t>
+              <a:t>10/20/2023</a:t>
             </a:fld>
             <a:endParaRPr lang="en-US"/>
           </a:p>
@@ -457,7 +457,7 @@
           <a:p>
             <a:fld id="{540F1410-67F1-4DB7-A3AF-1AB76F2DEBC1}" type="datetimeFigureOut">
               <a:rPr lang="en-US" smtClean="0"/>
-              <a:t>8/30/2022</a:t>
+              <a:t>10/20/2023</a:t>
             </a:fld>
             <a:endParaRPr lang="en-US"/>
           </a:p>
@@ -665,7 +665,7 @@
           <a:p>
             <a:fld id="{540F1410-67F1-4DB7-A3AF-1AB76F2DEBC1}" type="datetimeFigureOut">
               <a:rPr lang="en-US" smtClean="0"/>
-              <a:t>8/30/2022</a:t>
+              <a:t>10/20/2023</a:t>
             </a:fld>
             <a:endParaRPr lang="en-US"/>
           </a:p>
@@ -863,7 +863,7 @@
           <a:p>
             <a:fld id="{540F1410-67F1-4DB7-A3AF-1AB76F2DEBC1}" type="datetimeFigureOut">
               <a:rPr lang="en-US" smtClean="0"/>
-              <a:t>8/30/2022</a:t>
+              <a:t>10/20/2023</a:t>
             </a:fld>
             <a:endParaRPr lang="en-US"/>
           </a:p>
@@ -1138,7 +1138,7 @@
           <a:p>
             <a:fld id="{540F1410-67F1-4DB7-A3AF-1AB76F2DEBC1}" type="datetimeFigureOut">
               <a:rPr lang="en-US" smtClean="0"/>
-              <a:t>8/30/2022</a:t>
+              <a:t>10/20/2023</a:t>
             </a:fld>
             <a:endParaRPr lang="en-US"/>
           </a:p>
@@ -1403,7 +1403,7 @@
           <a:p>
             <a:fld id="{540F1410-67F1-4DB7-A3AF-1AB76F2DEBC1}" type="datetimeFigureOut">
               <a:rPr lang="en-US" smtClean="0"/>
-              <a:t>8/30/2022</a:t>
+              <a:t>10/20/2023</a:t>
             </a:fld>
             <a:endParaRPr lang="en-US"/>
           </a:p>
@@ -1815,7 +1815,7 @@
           <a:p>
             <a:fld id="{540F1410-67F1-4DB7-A3AF-1AB76F2DEBC1}" type="datetimeFigureOut">
               <a:rPr lang="en-US" smtClean="0"/>
-              <a:t>8/30/2022</a:t>
+              <a:t>10/20/2023</a:t>
             </a:fld>
             <a:endParaRPr lang="en-US"/>
           </a:p>
@@ -1956,7 +1956,7 @@
           <a:p>
             <a:fld id="{540F1410-67F1-4DB7-A3AF-1AB76F2DEBC1}" type="datetimeFigureOut">
               <a:rPr lang="en-US" smtClean="0"/>
-              <a:t>8/30/2022</a:t>
+              <a:t>10/20/2023</a:t>
             </a:fld>
             <a:endParaRPr lang="en-US"/>
           </a:p>
@@ -2069,7 +2069,7 @@
           <a:p>
             <a:fld id="{540F1410-67F1-4DB7-A3AF-1AB76F2DEBC1}" type="datetimeFigureOut">
               <a:rPr lang="en-US" smtClean="0"/>
-              <a:t>8/30/2022</a:t>
+              <a:t>10/20/2023</a:t>
             </a:fld>
             <a:endParaRPr lang="en-US"/>
           </a:p>
@@ -2380,7 +2380,7 @@
           <a:p>
             <a:fld id="{540F1410-67F1-4DB7-A3AF-1AB76F2DEBC1}" type="datetimeFigureOut">
               <a:rPr lang="en-US" smtClean="0"/>
-              <a:t>8/30/2022</a:t>
+              <a:t>10/20/2023</a:t>
             </a:fld>
             <a:endParaRPr lang="en-US"/>
           </a:p>
@@ -2668,7 +2668,7 @@
           <a:p>
             <a:fld id="{540F1410-67F1-4DB7-A3AF-1AB76F2DEBC1}" type="datetimeFigureOut">
               <a:rPr lang="en-US" smtClean="0"/>
-              <a:t>8/30/2022</a:t>
+              <a:t>10/20/2023</a:t>
             </a:fld>
             <a:endParaRPr lang="en-US"/>
           </a:p>
@@ -2909,7 +2909,7 @@
           <a:p>
             <a:fld id="{540F1410-67F1-4DB7-A3AF-1AB76F2DEBC1}" type="datetimeFigureOut">
               <a:rPr lang="en-US" smtClean="0"/>
-              <a:t>8/30/2022</a:t>
+              <a:t>10/20/2023</a:t>
             </a:fld>
             <a:endParaRPr lang="en-US"/>
           </a:p>
@@ -3492,7 +3492,7 @@
     </a:clrScheme>
     <a:fontScheme name="Office">
       <a:majorFont>
-        <a:latin typeface="Calibri Light" panose="020F0302020204030204"/>
+        <a:latin typeface="Liberation Sans"/>
         <a:ea typeface=""/>
         <a:cs typeface=""/>
         <a:font script="Jpan" typeface="游ゴシック Light"/>
@@ -3544,7 +3544,7 @@
         <a:font script="Tfng" typeface="Ebrima"/>
       </a:majorFont>
       <a:minorFont>
-        <a:latin typeface="Calibri" panose="020F0502020204030204"/>
+        <a:latin typeface="Liberation Sans"/>
         <a:ea typeface=""/>
         <a:cs typeface=""/>
         <a:font script="Jpan" typeface="游ゴシック"/>

</xml_diff>